<commit_message>
update Architecture portion of design.md
1. Update package diagram to reflect the current application architecture.
2. Apply darker colors as the new underlying colour scheme.
3. Fix inaccuracies such as Common component written in Gson (???)
</commit_message>
<xml_diff>
--- a/docs/images/highlevelArchitecture.pptx
+++ b/docs/images/highlevelArchitecture.pptx
@@ -305,7 +305,7 @@
             <a:fld id="{1D8BD707-D9CF-40AE-B4C6-C98DA3205C09}" type="datetimeFigureOut">
               <a:rPr lang="en-US" smtClean="0"/>
               <a:pPr/>
-              <a:t>8/5/2015</a:t>
+              <a:t>1/27/2017</a:t>
             </a:fld>
             <a:endParaRPr lang="en-US"/>
           </a:p>
@@ -472,7 +472,7 @@
             <a:fld id="{1D8BD707-D9CF-40AE-B4C6-C98DA3205C09}" type="datetimeFigureOut">
               <a:rPr lang="en-US" smtClean="0"/>
               <a:pPr/>
-              <a:t>8/5/2015</a:t>
+              <a:t>1/27/2017</a:t>
             </a:fld>
             <a:endParaRPr lang="en-US"/>
           </a:p>
@@ -649,7 +649,7 @@
             <a:fld id="{1D8BD707-D9CF-40AE-B4C6-C98DA3205C09}" type="datetimeFigureOut">
               <a:rPr lang="en-US" smtClean="0"/>
               <a:pPr/>
-              <a:t>8/5/2015</a:t>
+              <a:t>1/27/2017</a:t>
             </a:fld>
             <a:endParaRPr lang="en-US"/>
           </a:p>
@@ -816,7 +816,7 @@
             <a:fld id="{1D8BD707-D9CF-40AE-B4C6-C98DA3205C09}" type="datetimeFigureOut">
               <a:rPr lang="en-US" smtClean="0"/>
               <a:pPr/>
-              <a:t>8/5/2015</a:t>
+              <a:t>1/27/2017</a:t>
             </a:fld>
             <a:endParaRPr lang="en-US"/>
           </a:p>
@@ -1059,7 +1059,7 @@
             <a:fld id="{1D8BD707-D9CF-40AE-B4C6-C98DA3205C09}" type="datetimeFigureOut">
               <a:rPr lang="en-US" smtClean="0"/>
               <a:pPr/>
-              <a:t>8/5/2015</a:t>
+              <a:t>1/27/2017</a:t>
             </a:fld>
             <a:endParaRPr lang="en-US"/>
           </a:p>
@@ -1344,7 +1344,7 @@
             <a:fld id="{1D8BD707-D9CF-40AE-B4C6-C98DA3205C09}" type="datetimeFigureOut">
               <a:rPr lang="en-US" smtClean="0"/>
               <a:pPr/>
-              <a:t>8/5/2015</a:t>
+              <a:t>1/27/2017</a:t>
             </a:fld>
             <a:endParaRPr lang="en-US"/>
           </a:p>
@@ -1763,7 +1763,7 @@
             <a:fld id="{1D8BD707-D9CF-40AE-B4C6-C98DA3205C09}" type="datetimeFigureOut">
               <a:rPr lang="en-US" smtClean="0"/>
               <a:pPr/>
-              <a:t>8/5/2015</a:t>
+              <a:t>1/27/2017</a:t>
             </a:fld>
             <a:endParaRPr lang="en-US"/>
           </a:p>
@@ -1878,7 +1878,7 @@
             <a:fld id="{1D8BD707-D9CF-40AE-B4C6-C98DA3205C09}" type="datetimeFigureOut">
               <a:rPr lang="en-US" smtClean="0"/>
               <a:pPr/>
-              <a:t>8/5/2015</a:t>
+              <a:t>1/27/2017</a:t>
             </a:fld>
             <a:endParaRPr lang="en-US"/>
           </a:p>
@@ -1970,7 +1970,7 @@
             <a:fld id="{1D8BD707-D9CF-40AE-B4C6-C98DA3205C09}" type="datetimeFigureOut">
               <a:rPr lang="en-US" smtClean="0"/>
               <a:pPr/>
-              <a:t>8/5/2015</a:t>
+              <a:t>1/27/2017</a:t>
             </a:fld>
             <a:endParaRPr lang="en-US"/>
           </a:p>
@@ -2244,7 +2244,7 @@
             <a:fld id="{1D8BD707-D9CF-40AE-B4C6-C98DA3205C09}" type="datetimeFigureOut">
               <a:rPr lang="en-US" smtClean="0"/>
               <a:pPr/>
-              <a:t>8/5/2015</a:t>
+              <a:t>1/27/2017</a:t>
             </a:fld>
             <a:endParaRPr lang="en-US"/>
           </a:p>
@@ -2494,7 +2494,7 @@
             <a:fld id="{1D8BD707-D9CF-40AE-B4C6-C98DA3205C09}" type="datetimeFigureOut">
               <a:rPr lang="en-US" smtClean="0"/>
               <a:pPr/>
-              <a:t>8/5/2015</a:t>
+              <a:t>1/27/2017</a:t>
             </a:fld>
             <a:endParaRPr lang="en-US"/>
           </a:p>
@@ -2704,7 +2704,7 @@
             <a:fld id="{1D8BD707-D9CF-40AE-B4C6-C98DA3205C09}" type="datetimeFigureOut">
               <a:rPr lang="en-US" smtClean="0"/>
               <a:pPr/>
-              <a:t>8/5/2015</a:t>
+              <a:t>1/27/2017</a:t>
             </a:fld>
             <a:endParaRPr lang="en-US"/>
           </a:p>
@@ -3083,7 +3083,7 @@
         </p:nvSpPr>
         <p:spPr>
           <a:xfrm>
-            <a:off x="653990" y="61119"/>
+            <a:off x="912836" y="61119"/>
             <a:ext cx="1860610" cy="4648200"/>
           </a:xfrm>
           <a:prstGeom prst="roundRect">
@@ -3139,7 +3139,7 @@
         </p:nvSpPr>
         <p:spPr>
           <a:xfrm>
-            <a:off x="838200" y="2118519"/>
+            <a:off x="1097046" y="2042319"/>
             <a:ext cx="1524000" cy="1219200"/>
           </a:xfrm>
           <a:prstGeom prst="roundRect">
@@ -3149,13 +3149,15 @@
           </a:prstGeom>
           <a:solidFill>
             <a:schemeClr val="accent2">
-              <a:lumMod val="40000"/>
-              <a:lumOff val="60000"/>
+              <a:lumMod val="60000"/>
+              <a:lumOff val="40000"/>
             </a:schemeClr>
           </a:solidFill>
           <a:ln>
             <a:solidFill>
-              <a:schemeClr val="accent2"/>
+              <a:schemeClr val="accent2">
+                <a:lumMod val="75000"/>
+              </a:schemeClr>
             </a:solidFill>
           </a:ln>
         </p:spPr>
@@ -3264,7 +3266,7 @@
         </p:nvSpPr>
         <p:spPr>
           <a:xfrm>
-            <a:off x="838200" y="3490119"/>
+            <a:off x="1097046" y="3490119"/>
             <a:ext cx="1524000" cy="1143000"/>
           </a:xfrm>
           <a:prstGeom prst="roundRect">
@@ -3273,9 +3275,151 @@
             </a:avLst>
           </a:prstGeom>
           <a:solidFill>
+            <a:schemeClr val="accent6">
+              <a:lumMod val="60000"/>
+              <a:lumOff val="40000"/>
+            </a:schemeClr>
+          </a:solidFill>
+          <a:ln>
+            <a:solidFill>
+              <a:schemeClr val="accent6">
+                <a:lumMod val="75000"/>
+              </a:schemeClr>
+            </a:solidFill>
+          </a:ln>
+        </p:spPr>
+        <p:style>
+          <a:lnRef idx="2">
+            <a:schemeClr val="accent1">
+              <a:shade val="50000"/>
+            </a:schemeClr>
+          </a:lnRef>
+          <a:fillRef idx="1">
+            <a:schemeClr val="accent1"/>
+          </a:fillRef>
+          <a:effectRef idx="0">
+            <a:schemeClr val="accent1"/>
+          </a:effectRef>
+          <a:fontRef idx="minor">
+            <a:schemeClr val="lt1"/>
+          </a:fontRef>
+        </p:style>
+        <p:txBody>
+          <a:bodyPr rtlCol="0" anchor="t" anchorCtr="1"/>
+          <a:lstStyle/>
+          <a:p>
+            <a:pPr algn="r"/>
+            <a:r>
+              <a:rPr lang="en-US" sz="1600" b="1" dirty="0">
+                <a:solidFill>
+                  <a:schemeClr val="accent6">
+                    <a:lumMod val="75000"/>
+                  </a:schemeClr>
+                </a:solidFill>
+              </a:rPr>
+              <a:t>Client</a:t>
+            </a:r>
+            <a:endParaRPr lang="en-SG" sz="1600" b="1" dirty="0">
+              <a:solidFill>
+                <a:schemeClr val="accent6">
+                  <a:lumMod val="75000"/>
+                </a:schemeClr>
+              </a:solidFill>
+            </a:endParaRPr>
+          </a:p>
+        </p:txBody>
+      </p:sp>
+      <p:sp>
+        <p:nvSpPr>
+          <p:cNvPr id="63" name="Rounded Rectangle 62"/>
+          <p:cNvSpPr/>
+          <p:nvPr/>
+        </p:nvSpPr>
+        <p:spPr>
+          <a:xfrm>
+            <a:off x="5181600" y="975518"/>
+            <a:ext cx="1219200" cy="2438399"/>
+          </a:xfrm>
+          <a:prstGeom prst="roundRect">
+            <a:avLst>
+              <a:gd name="adj" fmla="val 9190"/>
+            </a:avLst>
+          </a:prstGeom>
+          <a:solidFill>
+            <a:schemeClr val="accent4">
+              <a:lumMod val="60000"/>
+              <a:lumOff val="40000"/>
+            </a:schemeClr>
+          </a:solidFill>
+          <a:ln>
+            <a:solidFill>
+              <a:schemeClr val="accent4">
+                <a:lumMod val="75000"/>
+              </a:schemeClr>
+            </a:solidFill>
+          </a:ln>
+        </p:spPr>
+        <p:style>
+          <a:lnRef idx="2">
+            <a:schemeClr val="accent1">
+              <a:shade val="50000"/>
+            </a:schemeClr>
+          </a:lnRef>
+          <a:fillRef idx="1">
+            <a:schemeClr val="accent1"/>
+          </a:fillRef>
+          <a:effectRef idx="0">
+            <a:schemeClr val="accent1"/>
+          </a:effectRef>
+          <a:fontRef idx="minor">
+            <a:schemeClr val="lt1"/>
+          </a:fontRef>
+        </p:style>
+        <p:txBody>
+          <a:bodyPr rtlCol="0" anchor="t" anchorCtr="1"/>
+          <a:lstStyle/>
+          <a:p>
+            <a:pPr algn="ctr"/>
+            <a:r>
+              <a:rPr lang="en-US" sz="1600" b="1" dirty="0" smtClean="0">
+                <a:solidFill>
+                  <a:schemeClr val="accent4">
+                    <a:lumMod val="75000"/>
+                  </a:schemeClr>
+                </a:solidFill>
+              </a:rPr>
+              <a:t>Logic</a:t>
+            </a:r>
+            <a:endParaRPr lang="en-SG" sz="1600" b="1" dirty="0">
+              <a:solidFill>
+                <a:schemeClr val="accent4">
+                  <a:lumMod val="75000"/>
+                </a:schemeClr>
+              </a:solidFill>
+            </a:endParaRPr>
+          </a:p>
+        </p:txBody>
+      </p:sp>
+      <p:sp>
+        <p:nvSpPr>
+          <p:cNvPr id="64" name="Rounded Rectangle 63"/>
+          <p:cNvSpPr/>
+          <p:nvPr/>
+        </p:nvSpPr>
+        <p:spPr>
+          <a:xfrm>
+            <a:off x="6802844" y="975518"/>
+            <a:ext cx="1143000" cy="1142999"/>
+          </a:xfrm>
+          <a:prstGeom prst="roundRect">
+            <a:avLst>
+              <a:gd name="adj" fmla="val 9190"/>
+            </a:avLst>
+          </a:prstGeom>
+          <a:solidFill>
             <a:schemeClr val="accent3">
-              <a:lumMod val="40000"/>
-              <a:lumOff val="60000"/>
+              <a:lumMod val="60000"/>
+              <a:lumOff val="40000"/>
             </a:schemeClr>
           </a:solidFill>
           <a:ln>
@@ -3308,14 +3452,14 @@
           <a:p>
             <a:pPr algn="r"/>
             <a:r>
-              <a:rPr lang="en-US" sz="1600" b="1" dirty="0">
+              <a:rPr lang="en-US" sz="1600" b="1" dirty="0" smtClean="0">
                 <a:solidFill>
                   <a:schemeClr val="accent3">
                     <a:lumMod val="75000"/>
                   </a:schemeClr>
                 </a:solidFill>
               </a:rPr>
-              <a:t>Client</a:t>
+              <a:t>Storage</a:t>
             </a:r>
             <a:endParaRPr lang="en-SG" sz="1600" b="1" dirty="0">
               <a:solidFill>
@@ -3329,14 +3473,14 @@
       </p:sp>
       <p:sp>
         <p:nvSpPr>
-          <p:cNvPr id="63" name="Rounded Rectangle 62"/>
+          <p:cNvPr id="65" name="Rounded Rectangle 64"/>
           <p:cNvSpPr/>
           <p:nvPr/>
         </p:nvSpPr>
         <p:spPr>
           <a:xfrm>
-            <a:off x="5181600" y="975518"/>
-            <a:ext cx="1219200" cy="2438399"/>
+            <a:off x="1112676" y="310050"/>
+            <a:ext cx="1502628" cy="1418629"/>
           </a:xfrm>
           <a:prstGeom prst="roundRect">
             <a:avLst>
@@ -3344,79 +3488,14 @@
             </a:avLst>
           </a:prstGeom>
           <a:solidFill>
-            <a:schemeClr val="accent4">
-              <a:lumMod val="40000"/>
-              <a:lumOff val="60000"/>
+            <a:schemeClr val="accent1">
+              <a:lumMod val="60000"/>
+              <a:lumOff val="40000"/>
             </a:schemeClr>
           </a:solidFill>
           <a:ln>
             <a:solidFill>
-              <a:schemeClr val="accent4"/>
-            </a:solidFill>
-          </a:ln>
-        </p:spPr>
-        <p:style>
-          <a:lnRef idx="2">
-            <a:schemeClr val="accent1">
-              <a:shade val="50000"/>
-            </a:schemeClr>
-          </a:lnRef>
-          <a:fillRef idx="1">
-            <a:schemeClr val="accent1"/>
-          </a:fillRef>
-          <a:effectRef idx="0">
-            <a:schemeClr val="accent1"/>
-          </a:effectRef>
-          <a:fontRef idx="minor">
-            <a:schemeClr val="lt1"/>
-          </a:fontRef>
-        </p:style>
-        <p:txBody>
-          <a:bodyPr rtlCol="0" anchor="t" anchorCtr="1"/>
-          <a:lstStyle/>
-          <a:p>
-            <a:pPr algn="ctr"/>
-            <a:r>
-              <a:rPr lang="en-US" sz="1600" b="1" dirty="0" smtClean="0">
-                <a:solidFill>
-                  <a:schemeClr val="accent4"/>
-                </a:solidFill>
-              </a:rPr>
-              <a:t>Logic</a:t>
-            </a:r>
-            <a:endParaRPr lang="en-SG" sz="1600" b="1" dirty="0">
-              <a:solidFill>
-                <a:schemeClr val="accent4"/>
-              </a:solidFill>
-            </a:endParaRPr>
-          </a:p>
-        </p:txBody>
-      </p:sp>
-      <p:sp>
-        <p:nvSpPr>
-          <p:cNvPr id="64" name="Rounded Rectangle 63"/>
-          <p:cNvSpPr/>
-          <p:nvPr/>
-        </p:nvSpPr>
-        <p:spPr>
-          <a:xfrm>
-            <a:off x="6858000" y="975519"/>
-            <a:ext cx="1143000" cy="1142999"/>
-          </a:xfrm>
-          <a:prstGeom prst="roundRect">
-            <a:avLst>
-              <a:gd name="adj" fmla="val 9190"/>
-            </a:avLst>
-          </a:prstGeom>
-          <a:solidFill>
-            <a:schemeClr val="accent3">
-              <a:lumMod val="40000"/>
-              <a:lumOff val="60000"/>
-            </a:schemeClr>
-          </a:solidFill>
-          <a:ln>
-            <a:solidFill>
-              <a:schemeClr val="accent3">
+              <a:schemeClr val="accent1">
                 <a:lumMod val="75000"/>
               </a:schemeClr>
             </a:solidFill>
@@ -3442,87 +3521,32 @@
           <a:bodyPr rtlCol="0" anchor="t" anchorCtr="1"/>
           <a:lstStyle/>
           <a:p>
-            <a:pPr algn="r"/>
+            <a:pPr algn="ctr"/>
             <a:r>
               <a:rPr lang="en-US" sz="1600" b="1" dirty="0" smtClean="0">
                 <a:solidFill>
-                  <a:schemeClr val="accent3">
+                  <a:schemeClr val="accent1">
                     <a:lumMod val="75000"/>
                   </a:schemeClr>
                 </a:solidFill>
               </a:rPr>
-              <a:t>Storage</a:t>
+              <a:t>UI (</a:t>
+            </a:r>
+            <a:r>
+              <a:rPr lang="en-US" sz="1600" b="1" dirty="0" smtClean="0">
+                <a:solidFill>
+                  <a:schemeClr val="accent1">
+                    <a:lumMod val="75000"/>
+                  </a:schemeClr>
+                </a:solidFill>
+              </a:rPr>
+              <a:t>browser)</a:t>
             </a:r>
             <a:endParaRPr lang="en-SG" sz="1600" b="1" dirty="0">
               <a:solidFill>
-                <a:schemeClr val="accent3">
+                <a:schemeClr val="accent1">
                   <a:lumMod val="75000"/>
                 </a:schemeClr>
-              </a:solidFill>
-            </a:endParaRPr>
-          </a:p>
-        </p:txBody>
-      </p:sp>
-      <p:sp>
-        <p:nvSpPr>
-          <p:cNvPr id="65" name="Rounded Rectangle 64"/>
-          <p:cNvSpPr/>
-          <p:nvPr/>
-        </p:nvSpPr>
-        <p:spPr>
-          <a:xfrm>
-            <a:off x="1219200" y="194469"/>
-            <a:ext cx="1143000" cy="1771650"/>
-          </a:xfrm>
-          <a:prstGeom prst="roundRect">
-            <a:avLst>
-              <a:gd name="adj" fmla="val 9190"/>
-            </a:avLst>
-          </a:prstGeom>
-          <a:solidFill>
-            <a:schemeClr val="accent1">
-              <a:lumMod val="40000"/>
-              <a:lumOff val="60000"/>
-            </a:schemeClr>
-          </a:solidFill>
-          <a:ln>
-            <a:solidFill>
-              <a:schemeClr val="accent1"/>
-            </a:solidFill>
-          </a:ln>
-        </p:spPr>
-        <p:style>
-          <a:lnRef idx="2">
-            <a:schemeClr val="accent1">
-              <a:shade val="50000"/>
-            </a:schemeClr>
-          </a:lnRef>
-          <a:fillRef idx="1">
-            <a:schemeClr val="accent1"/>
-          </a:fillRef>
-          <a:effectRef idx="0">
-            <a:schemeClr val="accent1"/>
-          </a:effectRef>
-          <a:fontRef idx="minor">
-            <a:schemeClr val="lt1"/>
-          </a:fontRef>
-        </p:style>
-        <p:txBody>
-          <a:bodyPr rtlCol="0" anchor="t" anchorCtr="1"/>
-          <a:lstStyle/>
-          <a:p>
-            <a:pPr algn="ctr"/>
-            <a:r>
-              <a:rPr lang="en-US" sz="1600" b="1" dirty="0" smtClean="0">
-                <a:solidFill>
-                  <a:schemeClr val="accent1"/>
-                </a:solidFill>
-              </a:rPr>
-              <a:t>UI (browser)</a:t>
-            </a:r>
-            <a:endParaRPr lang="en-SG" sz="1600" b="1" dirty="0">
-              <a:solidFill>
-                <a:schemeClr val="accent1"/>
               </a:solidFill>
             </a:endParaRPr>
           </a:p>
@@ -3546,13 +3570,15 @@
           </a:prstGeom>
           <a:solidFill>
             <a:schemeClr val="accent5">
-              <a:lumMod val="40000"/>
-              <a:lumOff val="60000"/>
+              <a:lumMod val="60000"/>
+              <a:lumOff val="40000"/>
             </a:schemeClr>
           </a:solidFill>
           <a:ln>
             <a:solidFill>
-              <a:schemeClr val="accent5"/>
+              <a:schemeClr val="accent5">
+                <a:lumMod val="75000"/>
+              </a:schemeClr>
             </a:solidFill>
           </a:ln>
         </p:spPr>
@@ -3579,14 +3605,18 @@
             <a:r>
               <a:rPr lang="en-US" sz="1600" b="1" dirty="0" smtClean="0">
                 <a:solidFill>
-                  <a:schemeClr val="accent5"/>
+                  <a:schemeClr val="accent5">
+                    <a:lumMod val="75000"/>
+                  </a:schemeClr>
                 </a:solidFill>
               </a:rPr>
               <a:t>Common</a:t>
             </a:r>
             <a:endParaRPr lang="en-SG" sz="1600" b="1" dirty="0">
               <a:solidFill>
-                <a:schemeClr val="accent5"/>
+                <a:schemeClr val="accent5">
+                  <a:lumMod val="75000"/>
+                </a:schemeClr>
               </a:solidFill>
             </a:endParaRPr>
           </a:p>
@@ -3601,14 +3631,16 @@
         <p:spPr>
           <a:xfrm>
             <a:off x="6400800" y="1432719"/>
-            <a:ext cx="457200" cy="0"/>
+            <a:ext cx="396000" cy="0"/>
           </a:xfrm>
           <a:prstGeom prst="straightConnector1">
             <a:avLst/>
           </a:prstGeom>
           <a:ln w="38100">
             <a:solidFill>
-              <a:srgbClr val="7030A0"/>
+              <a:schemeClr val="accent4">
+                <a:lumMod val="75000"/>
+              </a:schemeClr>
             </a:solidFill>
             <a:prstDash val="sysDot"/>
             <a:headEnd type="none" w="med" len="med"/>
@@ -3638,8 +3670,8 @@
         </p:nvCxnSpPr>
         <p:spPr>
           <a:xfrm>
-            <a:off x="2362200" y="2804319"/>
-            <a:ext cx="2819401" cy="0"/>
+            <a:off x="2670000" y="2880519"/>
+            <a:ext cx="2520000" cy="0"/>
           </a:xfrm>
           <a:prstGeom prst="straightConnector1">
             <a:avLst/>
@@ -3673,20 +3705,24 @@
       <p:cxnSp>
         <p:nvCxnSpPr>
           <p:cNvPr id="69" name="Straight Arrow Connector 68"/>
-          <p:cNvCxnSpPr/>
+          <p:cNvCxnSpPr>
+            <a:endCxn id="79" idx="0"/>
+          </p:cNvCxnSpPr>
           <p:nvPr/>
         </p:nvCxnSpPr>
         <p:spPr>
-          <a:xfrm>
-            <a:off x="4187582" y="645260"/>
-            <a:ext cx="3418" cy="406459"/>
+          <a:xfrm flipH="1">
+            <a:off x="4173038" y="665680"/>
+            <a:ext cx="0" cy="309838"/>
           </a:xfrm>
           <a:prstGeom prst="straightConnector1">
             <a:avLst/>
           </a:prstGeom>
           <a:ln w="38100">
             <a:solidFill>
-              <a:schemeClr val="accent1"/>
+              <a:schemeClr val="accent1">
+                <a:lumMod val="75000"/>
+              </a:schemeClr>
             </a:solidFill>
             <a:prstDash val="sysDot"/>
             <a:headEnd type="triangle" w="med" len="med"/>
@@ -3711,20 +3747,24 @@
       <p:cxnSp>
         <p:nvCxnSpPr>
           <p:cNvPr id="70" name="Straight Arrow Connector 69"/>
-          <p:cNvCxnSpPr/>
+          <p:cNvCxnSpPr>
+            <a:endCxn id="63" idx="0"/>
+          </p:cNvCxnSpPr>
           <p:nvPr/>
         </p:nvCxnSpPr>
         <p:spPr>
-          <a:xfrm>
-            <a:off x="5787782" y="647397"/>
-            <a:ext cx="3418" cy="328122"/>
+          <a:xfrm flipH="1">
+            <a:off x="5791200" y="665680"/>
+            <a:ext cx="0" cy="309838"/>
           </a:xfrm>
           <a:prstGeom prst="straightConnector1">
             <a:avLst/>
           </a:prstGeom>
           <a:ln w="38100">
             <a:solidFill>
-              <a:srgbClr val="7030A0"/>
+              <a:schemeClr val="accent4">
+                <a:lumMod val="75000"/>
+              </a:schemeClr>
             </a:solidFill>
             <a:prstDash val="sysDot"/>
             <a:headEnd type="triangle" w="med" len="med"/>
@@ -3749,13 +3789,15 @@
       <p:cxnSp>
         <p:nvCxnSpPr>
           <p:cNvPr id="71" name="Straight Arrow Connector 70"/>
-          <p:cNvCxnSpPr/>
+          <p:cNvCxnSpPr>
+            <a:stCxn id="64" idx="0"/>
+          </p:cNvCxnSpPr>
           <p:nvPr/>
         </p:nvCxnSpPr>
         <p:spPr>
-          <a:xfrm flipH="1" flipV="1">
-            <a:off x="7387982" y="647397"/>
-            <a:ext cx="3418" cy="328122"/>
+          <a:xfrm flipV="1">
+            <a:off x="7374344" y="670719"/>
+            <a:ext cx="0" cy="304799"/>
           </a:xfrm>
           <a:prstGeom prst="straightConnector1">
             <a:avLst/>
@@ -3794,15 +3836,17 @@
         </p:nvCxnSpPr>
         <p:spPr>
           <a:xfrm flipH="1">
-            <a:off x="2362200" y="1432719"/>
-            <a:ext cx="1295400" cy="0"/>
+            <a:off x="2613600" y="1432719"/>
+            <a:ext cx="1008000" cy="0"/>
           </a:xfrm>
           <a:prstGeom prst="straightConnector1">
             <a:avLst/>
           </a:prstGeom>
           <a:ln w="38100">
             <a:solidFill>
-              <a:schemeClr val="accent1"/>
+              <a:schemeClr val="accent1">
+                <a:lumMod val="75000"/>
+              </a:schemeClr>
             </a:solidFill>
             <a:prstDash val="sysDot"/>
             <a:headEnd type="triangle" w="med" len="med"/>
@@ -3827,13 +3871,15 @@
       <p:cxnSp>
         <p:nvCxnSpPr>
           <p:cNvPr id="74" name="Straight Arrow Connector 73"/>
-          <p:cNvCxnSpPr/>
+          <p:cNvCxnSpPr>
+            <a:endCxn id="65" idx="1"/>
+          </p:cNvCxnSpPr>
           <p:nvPr/>
         </p:nvCxnSpPr>
         <p:spPr>
-          <a:xfrm flipV="1">
-            <a:off x="457200" y="1127919"/>
-            <a:ext cx="762000" cy="24214"/>
+          <a:xfrm>
+            <a:off x="751302" y="1015390"/>
+            <a:ext cx="361374" cy="3975"/>
           </a:xfrm>
           <a:prstGeom prst="straightConnector1">
             <a:avLst/>
@@ -3870,8 +3916,8 @@
         </p:nvSpPr>
         <p:spPr>
           <a:xfrm>
-            <a:off x="1219200" y="899319"/>
-            <a:ext cx="1066800" cy="864015"/>
+            <a:off x="1125824" y="838492"/>
+            <a:ext cx="1505756" cy="904398"/>
           </a:xfrm>
           <a:prstGeom prst="rect">
             <a:avLst/>
@@ -3978,12 +4024,12 @@
               <a:t>HTML, CSS, JavaScript, </a:t>
             </a:r>
             <a:r>
-              <a:rPr lang="en-US" dirty="0" err="1" smtClean="0">
+              <a:rPr lang="en-US" dirty="0" smtClean="0">
                 <a:solidFill>
                   <a:schemeClr val="bg1"/>
                 </a:solidFill>
               </a:rPr>
-              <a:t>JQuery</a:t>
+              <a:t>jQuery, Bootstrap</a:t>
             </a:r>
             <a:endParaRPr lang="en-SG" dirty="0">
               <a:solidFill>
@@ -4001,8 +4047,8 @@
         </p:nvSpPr>
         <p:spPr>
           <a:xfrm>
-            <a:off x="838200" y="2423319"/>
-            <a:ext cx="1524000" cy="914400"/>
+            <a:off x="1097046" y="2475509"/>
+            <a:ext cx="1524000" cy="786009"/>
           </a:xfrm>
           <a:prstGeom prst="rect">
             <a:avLst/>
@@ -4140,22 +4186,6 @@
               </a:rPr>
               <a:t>HttpUnit</a:t>
             </a:r>
-            <a:r>
-              <a:rPr lang="en-US" dirty="0" smtClean="0">
-                <a:solidFill>
-                  <a:schemeClr val="bg1"/>
-                </a:solidFill>
-              </a:rPr>
-              <a:t>, </a:t>
-            </a:r>
-            <a:r>
-              <a:rPr lang="en-US" dirty="0" err="1" smtClean="0">
-                <a:solidFill>
-                  <a:schemeClr val="bg1"/>
-                </a:solidFill>
-              </a:rPr>
-              <a:t>NekoHtml</a:t>
-            </a:r>
             <a:endParaRPr lang="en-SG" dirty="0">
               <a:solidFill>
                 <a:schemeClr val="bg1"/>
@@ -4172,8 +4202,8 @@
         </p:nvSpPr>
         <p:spPr>
           <a:xfrm>
-            <a:off x="5334000" y="1356519"/>
-            <a:ext cx="888228" cy="533400"/>
+            <a:off x="5181598" y="1432719"/>
+            <a:ext cx="1219201" cy="533400"/>
           </a:xfrm>
           <a:prstGeom prst="rect">
             <a:avLst/>
@@ -4277,7 +4307,7 @@
                   <a:schemeClr val="bg1"/>
                 </a:solidFill>
               </a:rPr>
-              <a:t>Java, Servlets</a:t>
+              <a:t>Java</a:t>
             </a:r>
             <a:endParaRPr lang="en-SG" dirty="0">
               <a:solidFill>
@@ -4295,8 +4325,8 @@
         </p:nvSpPr>
         <p:spPr>
           <a:xfrm>
-            <a:off x="3657600" y="2499519"/>
-            <a:ext cx="1395457" cy="304800"/>
+            <a:off x="3504614" y="2575719"/>
+            <a:ext cx="1548443" cy="304800"/>
           </a:xfrm>
           <a:prstGeom prst="rect">
             <a:avLst/>
@@ -4398,18 +4428,26 @@
               <a:rPr lang="en-US" dirty="0" smtClean="0">
                 <a:solidFill>
                   <a:schemeClr val="accent2">
-                    <a:lumMod val="40000"/>
-                    <a:lumOff val="60000"/>
+                    <a:lumMod val="75000"/>
                   </a:schemeClr>
                 </a:solidFill>
               </a:rPr>
-              <a:t>JSON over HTTP</a:t>
+              <a:t>JSON </a:t>
+            </a:r>
+            <a:r>
+              <a:rPr lang="en-US" dirty="0" smtClean="0">
+                <a:solidFill>
+                  <a:schemeClr val="accent2">
+                    <a:lumMod val="75000"/>
+                  </a:schemeClr>
+                </a:solidFill>
+              </a:rPr>
+              <a:t>(over HTTP)</a:t>
             </a:r>
             <a:endParaRPr lang="en-SG" dirty="0">
               <a:solidFill>
                 <a:schemeClr val="accent2">
-                  <a:lumMod val="40000"/>
-                  <a:lumOff val="60000"/>
+                  <a:lumMod val="75000"/>
                 </a:schemeClr>
               </a:solidFill>
             </a:endParaRPr>
@@ -4425,7 +4463,7 @@
         <p:spPr>
           <a:xfrm>
             <a:off x="3657600" y="975518"/>
-            <a:ext cx="1030876" cy="1243413"/>
+            <a:ext cx="1030876" cy="1485503"/>
           </a:xfrm>
           <a:prstGeom prst="roundRect">
             <a:avLst>
@@ -4434,13 +4472,15 @@
           </a:prstGeom>
           <a:solidFill>
             <a:schemeClr val="accent1">
-              <a:lumMod val="40000"/>
-              <a:lumOff val="60000"/>
+              <a:lumMod val="60000"/>
+              <a:lumOff val="40000"/>
             </a:schemeClr>
           </a:solidFill>
           <a:ln>
             <a:solidFill>
-              <a:schemeClr val="accent1"/>
+              <a:schemeClr val="accent1">
+                <a:lumMod val="75000"/>
+              </a:schemeClr>
             </a:solidFill>
           </a:ln>
         </p:spPr>
@@ -4468,14 +4508,18 @@
             <a:r>
               <a:rPr lang="en-US" sz="1600" b="1" dirty="0" smtClean="0">
                 <a:solidFill>
-                  <a:schemeClr val="accent1"/>
+                  <a:schemeClr val="accent1">
+                    <a:lumMod val="75000"/>
+                  </a:schemeClr>
                 </a:solidFill>
               </a:rPr>
               <a:t>UI (server)</a:t>
             </a:r>
             <a:endParaRPr lang="en-SG" sz="1600" b="1" dirty="0">
               <a:solidFill>
-                <a:schemeClr val="accent1"/>
+                <a:schemeClr val="accent1">
+                  <a:lumMod val="75000"/>
+                </a:schemeClr>
               </a:solidFill>
             </a:endParaRPr>
           </a:p>
@@ -4489,8 +4533,8 @@
         </p:nvSpPr>
         <p:spPr>
           <a:xfrm>
-            <a:off x="3733800" y="1508919"/>
-            <a:ext cx="889919" cy="685800"/>
+            <a:off x="3657600" y="1637106"/>
+            <a:ext cx="1030876" cy="738433"/>
           </a:xfrm>
           <a:prstGeom prst="rect">
             <a:avLst/>
@@ -4594,7 +4638,7 @@
                   <a:schemeClr val="bg1"/>
                 </a:solidFill>
               </a:rPr>
-              <a:t>JSP using </a:t>
+              <a:t>JSP/JSTL</a:t>
             </a:r>
             <a:r>
               <a:rPr lang="en-US" dirty="0" smtClean="0">
@@ -4602,7 +4646,15 @@
                   <a:schemeClr val="bg1"/>
                 </a:solidFill>
               </a:rPr>
-              <a:t>JSTL, Servlets </a:t>
+              <a:t>, </a:t>
+            </a:r>
+            <a:r>
+              <a:rPr lang="en-US" dirty="0" smtClean="0">
+                <a:solidFill>
+                  <a:schemeClr val="bg1"/>
+                </a:solidFill>
+              </a:rPr>
+              <a:t>Java Servlets </a:t>
             </a:r>
             <a:endParaRPr lang="en-SG" dirty="0">
               <a:solidFill>
@@ -4620,7 +4672,7 @@
         </p:nvSpPr>
         <p:spPr>
           <a:xfrm>
-            <a:off x="2667000" y="1127919"/>
+            <a:off x="2769372" y="1127919"/>
             <a:ext cx="659628" cy="533400"/>
           </a:xfrm>
           <a:prstGeom prst="rect">
@@ -4723,8 +4775,7 @@
               <a:rPr lang="en-US" sz="1600" dirty="0" smtClean="0">
                 <a:solidFill>
                   <a:schemeClr val="accent1">
-                    <a:lumMod val="40000"/>
-                    <a:lumOff val="60000"/>
+                    <a:lumMod val="75000"/>
                   </a:schemeClr>
                 </a:solidFill>
               </a:rPr>
@@ -4733,8 +4784,7 @@
             <a:endParaRPr lang="en-SG" sz="1600" dirty="0">
               <a:solidFill>
                 <a:schemeClr val="accent1">
-                  <a:lumMod val="40000"/>
-                  <a:lumOff val="60000"/>
+                  <a:lumMod val="75000"/>
                 </a:schemeClr>
               </a:solidFill>
             </a:endParaRPr>
@@ -4757,7 +4807,9 @@
           </a:prstGeom>
           <a:ln w="38100">
             <a:solidFill>
-              <a:schemeClr val="accent1"/>
+              <a:schemeClr val="accent1">
+                <a:lumMod val="75000"/>
+              </a:schemeClr>
             </a:solidFill>
             <a:prstDash val="sysDot"/>
             <a:headEnd type="triangle" w="med" len="med"/>
@@ -4782,17 +4834,20 @@
       <p:cxnSp>
         <p:nvCxnSpPr>
           <p:cNvPr id="83" name="Elbow Connector 82"/>
-          <p:cNvCxnSpPr/>
+          <p:cNvCxnSpPr>
+            <a:stCxn id="90" idx="0"/>
+            <a:endCxn id="65" idx="2"/>
+          </p:cNvCxnSpPr>
           <p:nvPr/>
         </p:nvCxnSpPr>
         <p:spPr>
           <a:xfrm rot="5400000" flipH="1" flipV="1">
-            <a:off x="723900" y="1623219"/>
-            <a:ext cx="685800" cy="304800"/>
+            <a:off x="1704698" y="1883027"/>
+            <a:ext cx="313640" cy="4944"/>
           </a:xfrm>
           <a:prstGeom prst="bentConnector3">
             <a:avLst>
-              <a:gd name="adj1" fmla="val 99844"/>
+              <a:gd name="adj1" fmla="val 50000"/>
             </a:avLst>
           </a:prstGeom>
           <a:ln w="38100">
@@ -4829,8 +4884,8 @@
         </p:nvSpPr>
         <p:spPr>
           <a:xfrm>
-            <a:off x="6934200" y="1432719"/>
-            <a:ext cx="888228" cy="285750"/>
+            <a:off x="6796801" y="1432719"/>
+            <a:ext cx="1149043" cy="285750"/>
           </a:xfrm>
           <a:prstGeom prst="rect">
             <a:avLst/>
@@ -4952,7 +5007,7 @@
         </p:nvSpPr>
         <p:spPr>
           <a:xfrm>
-            <a:off x="7315200" y="2365813"/>
+            <a:off x="6781800" y="2442013"/>
             <a:ext cx="583428" cy="362306"/>
           </a:xfrm>
           <a:prstGeom prst="rect">
@@ -5055,8 +5110,7 @@
               <a:rPr lang="en-US" dirty="0" smtClean="0">
                 <a:solidFill>
                   <a:schemeClr val="accent3">
-                    <a:lumMod val="60000"/>
-                    <a:lumOff val="40000"/>
+                    <a:lumMod val="75000"/>
                   </a:schemeClr>
                 </a:solidFill>
               </a:rPr>
@@ -5065,8 +5119,7 @@
             <a:endParaRPr lang="en-SG" dirty="0">
               <a:solidFill>
                 <a:schemeClr val="accent3">
-                  <a:lumMod val="60000"/>
-                  <a:lumOff val="40000"/>
+                  <a:lumMod val="75000"/>
                 </a:schemeClr>
               </a:solidFill>
             </a:endParaRPr>
@@ -5168,14 +5221,15 @@
             </a:pathLst>
           </a:custGeom>
           <a:solidFill>
-            <a:schemeClr val="accent6">
-              <a:lumMod val="40000"/>
-              <a:lumOff val="60000"/>
+            <a:schemeClr val="bg1">
+              <a:lumMod val="75000"/>
             </a:schemeClr>
           </a:solidFill>
           <a:ln>
             <a:solidFill>
-              <a:schemeClr val="accent6"/>
+              <a:schemeClr val="bg1">
+                <a:lumMod val="65000"/>
+              </a:schemeClr>
             </a:solidFill>
           </a:ln>
         </p:spPr>
@@ -5207,7 +5261,7 @@
             <a:pPr algn="ctr"/>
             <a:endParaRPr lang="en-SG" sz="1600" b="1" dirty="0">
               <a:solidFill>
-                <a:schemeClr val="accent6"/>
+                <a:schemeClr val="bg1"/>
               </a:solidFill>
             </a:endParaRPr>
           </a:p>
@@ -5222,7 +5276,7 @@
         <p:spPr>
           <a:xfrm>
             <a:off x="4267200" y="4404519"/>
-            <a:ext cx="2438400" cy="227111"/>
+            <a:ext cx="2438400" cy="304800"/>
           </a:xfrm>
           <a:prstGeom prst="rect">
             <a:avLst/>
@@ -5327,7 +5381,7 @@
             <a:r>
               <a:rPr lang="en-US" dirty="0">
                 <a:solidFill>
-                  <a:schemeClr val="accent6"/>
+                  <a:schemeClr val="bg1"/>
                 </a:solidFill>
               </a:rPr>
               <a:t>Google App </a:t>
@@ -5335,14 +5389,14 @@
             <a:r>
               <a:rPr lang="en-US" dirty="0" smtClean="0">
                 <a:solidFill>
-                  <a:schemeClr val="accent6"/>
+                  <a:schemeClr val="bg1"/>
                 </a:solidFill>
               </a:rPr>
               <a:t>Engine (GAE)</a:t>
             </a:r>
             <a:endParaRPr lang="en-SG" dirty="0">
               <a:solidFill>
-                <a:schemeClr val="accent6"/>
+                <a:schemeClr val="bg1"/>
               </a:solidFill>
             </a:endParaRPr>
           </a:p>
@@ -5363,14 +5417,15 @@
             <a:avLst/>
           </a:prstGeom>
           <a:solidFill>
-            <a:schemeClr val="accent6">
-              <a:lumMod val="40000"/>
-              <a:lumOff val="60000"/>
+            <a:schemeClr val="bg1">
+              <a:lumMod val="75000"/>
             </a:schemeClr>
           </a:solidFill>
           <a:ln>
             <a:solidFill>
-              <a:schemeClr val="accent6"/>
+              <a:schemeClr val="bg1">
+                <a:lumMod val="65000"/>
+              </a:schemeClr>
             </a:solidFill>
           </a:ln>
         </p:spPr>
@@ -5403,7 +5458,7 @@
             <a:r>
               <a:rPr lang="en-US" sz="1600" b="1" dirty="0">
                 <a:solidFill>
-                  <a:schemeClr val="accent6"/>
+                  <a:schemeClr val="bg1"/>
                 </a:solidFill>
               </a:rPr>
               <a:t>GAE </a:t>
@@ -5411,14 +5466,14 @@
             <a:r>
               <a:rPr lang="en-US" sz="1600" b="1" dirty="0" err="1">
                 <a:solidFill>
-                  <a:schemeClr val="accent6"/>
+                  <a:schemeClr val="bg1"/>
                 </a:solidFill>
               </a:rPr>
               <a:t>Datastore</a:t>
             </a:r>
             <a:endParaRPr lang="en-SG" sz="1600" b="1" dirty="0">
               <a:solidFill>
-                <a:schemeClr val="accent6"/>
+                <a:schemeClr val="bg1"/>
               </a:solidFill>
             </a:endParaRPr>
           </a:p>
@@ -5429,13 +5484,14 @@
           <p:cNvPr id="86" name="Straight Arrow Connector 85"/>
           <p:cNvCxnSpPr>
             <a:stCxn id="85" idx="4"/>
+            <a:endCxn id="64" idx="2"/>
           </p:cNvCxnSpPr>
           <p:nvPr/>
         </p:nvCxnSpPr>
         <p:spPr>
           <a:xfrm flipV="1">
-            <a:off x="7365814" y="2118519"/>
-            <a:ext cx="14683" cy="1143000"/>
+            <a:off x="7365814" y="2118517"/>
+            <a:ext cx="8530" cy="1143002"/>
           </a:xfrm>
           <a:prstGeom prst="straightConnector1">
             <a:avLst/>
@@ -5474,7 +5530,7 @@
         </p:nvSpPr>
         <p:spPr>
           <a:xfrm>
-            <a:off x="3488924" y="3443171"/>
+            <a:off x="3488924" y="3566319"/>
             <a:ext cx="2133600" cy="304800"/>
           </a:xfrm>
           <a:prstGeom prst="rect">
@@ -5520,18 +5576,22 @@
           </a:lstStyle>
           <a:p>
             <a:r>
-              <a:rPr lang="en-US" dirty="0"/>
-              <a:t>Remote API </a:t>
-            </a:r>
-            <a:r>
-              <a:rPr lang="en-US" dirty="0" smtClean="0"/>
-              <a:t>(</a:t>
-            </a:r>
-            <a:r>
-              <a:rPr lang="en-US" dirty="0"/>
-              <a:t>GAE)</a:t>
-            </a:r>
-            <a:endParaRPr lang="en-SG" dirty="0"/>
+              <a:rPr lang="en-US" dirty="0" smtClean="0">
+                <a:solidFill>
+                  <a:schemeClr val="accent6">
+                    <a:lumMod val="75000"/>
+                  </a:schemeClr>
+                </a:solidFill>
+              </a:rPr>
+              <a:t>GAE Remote API</a:t>
+            </a:r>
+            <a:endParaRPr lang="en-SG" dirty="0">
+              <a:solidFill>
+                <a:schemeClr val="accent6">
+                  <a:lumMod val="75000"/>
+                </a:schemeClr>
+              </a:solidFill>
+            </a:endParaRPr>
           </a:p>
         </p:txBody>
       </p:sp>
@@ -5543,7 +5603,7 @@
         </p:nvSpPr>
         <p:spPr>
           <a:xfrm>
-            <a:off x="-76200" y="2042319"/>
+            <a:off x="-60030" y="2160512"/>
             <a:ext cx="990600" cy="304800"/>
           </a:xfrm>
           <a:prstGeom prst="rect">
@@ -5645,14 +5705,18 @@
             <a:r>
               <a:rPr lang="en-US" sz="1200" dirty="0" smtClean="0">
                 <a:solidFill>
-                  <a:schemeClr val="accent2"/>
+                  <a:schemeClr val="accent2">
+                    <a:lumMod val="75000"/>
+                  </a:schemeClr>
                 </a:solidFill>
               </a:rPr>
               <a:t>Developers</a:t>
             </a:r>
             <a:endParaRPr lang="en-SG" sz="1200" dirty="0">
               <a:solidFill>
-                <a:schemeClr val="accent2"/>
+                <a:schemeClr val="accent2">
+                  <a:lumMod val="75000"/>
+                </a:schemeClr>
               </a:solidFill>
             </a:endParaRPr>
           </a:p>
@@ -5666,8 +5730,8 @@
         </p:nvCxnSpPr>
         <p:spPr>
           <a:xfrm>
-            <a:off x="457200" y="3794919"/>
-            <a:ext cx="381000" cy="0"/>
+            <a:off x="742507" y="4060926"/>
+            <a:ext cx="354539" cy="1"/>
           </a:xfrm>
           <a:prstGeom prst="straightConnector1">
             <a:avLst/>
@@ -5699,13 +5763,15 @@
       <p:cxnSp>
         <p:nvCxnSpPr>
           <p:cNvPr id="121" name="Straight Arrow Connector 120"/>
-          <p:cNvCxnSpPr/>
+          <p:cNvCxnSpPr>
+            <a:endCxn id="90" idx="1"/>
+          </p:cNvCxnSpPr>
           <p:nvPr/>
         </p:nvCxnSpPr>
         <p:spPr>
-          <a:xfrm>
-            <a:off x="457200" y="2575719"/>
-            <a:ext cx="381000" cy="0"/>
+          <a:xfrm flipV="1">
+            <a:off x="741707" y="2651919"/>
+            <a:ext cx="355339" cy="8147"/>
           </a:xfrm>
           <a:prstGeom prst="straightConnector1">
             <a:avLst/>
@@ -5742,7 +5808,7 @@
         </p:nvSpPr>
         <p:spPr>
           <a:xfrm>
-            <a:off x="-108010" y="3261519"/>
+            <a:off x="66323" y="3556034"/>
             <a:ext cx="762000" cy="304800"/>
           </a:xfrm>
           <a:prstGeom prst="rect">
@@ -5844,7 +5910,7 @@
             <a:r>
               <a:rPr lang="en-US" sz="1200" dirty="0" smtClean="0">
                 <a:solidFill>
-                  <a:schemeClr val="accent3">
+                  <a:schemeClr val="accent6">
                     <a:lumMod val="75000"/>
                   </a:schemeClr>
                 </a:solidFill>
@@ -5853,7 +5919,7 @@
             </a:r>
             <a:endParaRPr lang="en-SG" sz="1200" dirty="0">
               <a:solidFill>
-                <a:schemeClr val="accent3">
+                <a:schemeClr val="accent6">
                   <a:lumMod val="75000"/>
                 </a:schemeClr>
               </a:solidFill>
@@ -5869,8 +5935,8 @@
         </p:nvSpPr>
         <p:spPr>
           <a:xfrm>
-            <a:off x="-152400" y="670719"/>
-            <a:ext cx="762000" cy="304800"/>
+            <a:off x="74039" y="513280"/>
+            <a:ext cx="711376" cy="304800"/>
           </a:xfrm>
           <a:prstGeom prst="rect">
             <a:avLst/>
@@ -5971,14 +6037,18 @@
             <a:r>
               <a:rPr lang="en-US" sz="1200" dirty="0" smtClean="0">
                 <a:solidFill>
-                  <a:schemeClr val="accent1"/>
+                  <a:schemeClr val="accent1">
+                    <a:lumMod val="75000"/>
+                  </a:schemeClr>
                 </a:solidFill>
               </a:rPr>
               <a:t>Users</a:t>
             </a:r>
             <a:endParaRPr lang="en-SG" sz="1200" dirty="0">
               <a:solidFill>
-                <a:schemeClr val="accent1"/>
+                <a:schemeClr val="accent1">
+                  <a:lumMod val="75000"/>
+                </a:schemeClr>
               </a:solidFill>
             </a:endParaRPr>
           </a:p>
@@ -5992,15 +6062,15 @@
         </p:nvCxnSpPr>
         <p:spPr>
           <a:xfrm flipH="1">
-            <a:off x="2362200" y="3742931"/>
-            <a:ext cx="4495805" cy="0"/>
+            <a:off x="2654400" y="3866079"/>
+            <a:ext cx="4212000" cy="0"/>
           </a:xfrm>
           <a:prstGeom prst="straightConnector1">
             <a:avLst/>
           </a:prstGeom>
           <a:ln w="38100">
             <a:solidFill>
-              <a:schemeClr val="accent3">
+              <a:schemeClr val="accent6">
                 <a:lumMod val="75000"/>
               </a:schemeClr>
             </a:solidFill>
@@ -6032,7 +6102,7 @@
         </p:nvGrpSpPr>
         <p:grpSpPr>
           <a:xfrm>
-            <a:off x="69192" y="931968"/>
+            <a:off x="253529" y="847433"/>
             <a:ext cx="388008" cy="342473"/>
             <a:chOff x="678792" y="144177"/>
             <a:chExt cx="441804" cy="392765"/>
@@ -6071,7 +6141,9 @@
               </a:solidFill>
               <a:ln>
                 <a:solidFill>
-                  <a:schemeClr val="accent1"/>
+                  <a:schemeClr val="accent1">
+                    <a:lumMod val="75000"/>
+                  </a:schemeClr>
                 </a:solidFill>
               </a:ln>
             </p:spPr>
@@ -6119,7 +6191,9 @@
               </a:solidFill>
               <a:ln>
                 <a:solidFill>
-                  <a:schemeClr val="accent1"/>
+                  <a:schemeClr val="accent1">
+                    <a:lumMod val="75000"/>
+                  </a:schemeClr>
                 </a:solidFill>
               </a:ln>
             </p:spPr>
@@ -6168,7 +6242,9 @@
             </a:solidFill>
             <a:ln cap="rnd">
               <a:solidFill>
-                <a:schemeClr val="accent1"/>
+                <a:schemeClr val="accent1">
+                  <a:lumMod val="75000"/>
+                </a:schemeClr>
               </a:solidFill>
             </a:ln>
           </p:spPr>
@@ -6246,7 +6322,9 @@
             </a:solidFill>
             <a:ln cap="rnd">
               <a:solidFill>
-                <a:schemeClr val="accent1"/>
+                <a:schemeClr val="accent1">
+                  <a:lumMod val="75000"/>
+                </a:schemeClr>
               </a:solidFill>
             </a:ln>
           </p:spPr>
@@ -6284,7 +6362,7 @@
         </p:nvGrpSpPr>
         <p:grpSpPr>
           <a:xfrm>
-            <a:off x="52461" y="2323474"/>
+            <a:off x="258207" y="2489522"/>
             <a:ext cx="388008" cy="342473"/>
             <a:chOff x="678792" y="144177"/>
             <a:chExt cx="441804" cy="392765"/>
@@ -6323,7 +6401,9 @@
               </a:solidFill>
               <a:ln>
                 <a:solidFill>
-                  <a:schemeClr val="accent2"/>
+                  <a:schemeClr val="accent2">
+                    <a:lumMod val="75000"/>
+                  </a:schemeClr>
                 </a:solidFill>
               </a:ln>
             </p:spPr>
@@ -6371,7 +6451,9 @@
               </a:solidFill>
               <a:ln>
                 <a:solidFill>
-                  <a:schemeClr val="accent2"/>
+                  <a:schemeClr val="accent2">
+                    <a:lumMod val="75000"/>
+                  </a:schemeClr>
                 </a:solidFill>
               </a:ln>
             </p:spPr>
@@ -6420,7 +6502,9 @@
             </a:solidFill>
             <a:ln cap="rnd">
               <a:solidFill>
-                <a:schemeClr val="accent2"/>
+                <a:schemeClr val="accent2">
+                  <a:lumMod val="75000"/>
+                </a:schemeClr>
               </a:solidFill>
             </a:ln>
           </p:spPr>
@@ -6498,7 +6582,9 @@
             </a:solidFill>
             <a:ln cap="rnd">
               <a:solidFill>
-                <a:schemeClr val="accent2"/>
+                <a:schemeClr val="accent2">
+                  <a:lumMod val="75000"/>
+                </a:schemeClr>
               </a:solidFill>
             </a:ln>
           </p:spPr>
@@ -6536,7 +6622,7 @@
         </p:nvGrpSpPr>
         <p:grpSpPr>
           <a:xfrm>
-            <a:off x="67006" y="3560763"/>
+            <a:off x="270260" y="3890382"/>
             <a:ext cx="388008" cy="342473"/>
             <a:chOff x="678792" y="144177"/>
             <a:chExt cx="441804" cy="392765"/>
@@ -6575,7 +6661,7 @@
               </a:solidFill>
               <a:ln>
                 <a:solidFill>
-                  <a:schemeClr val="accent3">
+                  <a:schemeClr val="accent6">
                     <a:lumMod val="75000"/>
                   </a:schemeClr>
                 </a:solidFill>
@@ -6625,7 +6711,7 @@
               </a:solidFill>
               <a:ln>
                 <a:solidFill>
-                  <a:schemeClr val="accent3">
+                  <a:schemeClr val="accent6">
                     <a:lumMod val="75000"/>
                   </a:schemeClr>
                 </a:solidFill>
@@ -6676,7 +6762,7 @@
             </a:solidFill>
             <a:ln cap="rnd">
               <a:solidFill>
-                <a:schemeClr val="accent3">
+                <a:schemeClr val="accent6">
                   <a:lumMod val="75000"/>
                 </a:schemeClr>
               </a:solidFill>
@@ -6756,7 +6842,7 @@
             </a:solidFill>
             <a:ln cap="rnd">
               <a:solidFill>
-                <a:schemeClr val="accent3">
+                <a:schemeClr val="accent6">
                   <a:lumMod val="75000"/>
                 </a:schemeClr>
               </a:solidFill>
@@ -6790,14 +6876,14 @@
       </p:grpSp>
       <p:sp>
         <p:nvSpPr>
-          <p:cNvPr id="57" name="TextBox 56"/>
+          <p:cNvPr id="91" name="TextBox 90"/>
           <p:cNvSpPr txBox="1"/>
           <p:nvPr/>
         </p:nvSpPr>
         <p:spPr>
           <a:xfrm>
-            <a:off x="6400800" y="232701"/>
-            <a:ext cx="1319257" cy="381000"/>
+            <a:off x="1097046" y="3926443"/>
+            <a:ext cx="1518258" cy="706675"/>
           </a:xfrm>
           <a:prstGeom prst="rect">
             <a:avLst/>
@@ -6896,12 +6982,135 @@
           <a:p>
             <a:pPr algn="ctr"/>
             <a:r>
-              <a:rPr lang="en-US" dirty="0" err="1" smtClean="0">
+              <a:rPr lang="en-US" dirty="0" smtClean="0">
                 <a:solidFill>
                   <a:schemeClr val="bg1"/>
                 </a:solidFill>
               </a:rPr>
-              <a:t>GSon</a:t>
+              <a:t>Java</a:t>
+            </a:r>
+            <a:endParaRPr lang="en-SG" dirty="0">
+              <a:solidFill>
+                <a:schemeClr val="bg1"/>
+              </a:solidFill>
+            </a:endParaRPr>
+          </a:p>
+        </p:txBody>
+      </p:sp>
+      <p:sp>
+        <p:nvSpPr>
+          <p:cNvPr id="94" name="TextBox 93"/>
+          <p:cNvSpPr txBox="1"/>
+          <p:nvPr/>
+        </p:nvSpPr>
+        <p:spPr>
+          <a:xfrm>
+            <a:off x="6553200" y="182273"/>
+            <a:ext cx="1219201" cy="469396"/>
+          </a:xfrm>
+          <a:prstGeom prst="rect">
+            <a:avLst/>
+          </a:prstGeom>
+          <a:grpFill/>
+          <a:ln>
+            <a:noFill/>
+          </a:ln>
+        </p:spPr>
+        <p:style>
+          <a:lnRef idx="2">
+            <a:schemeClr val="accent1">
+              <a:shade val="50000"/>
+            </a:schemeClr>
+          </a:lnRef>
+          <a:fillRef idx="1">
+            <a:schemeClr val="accent1"/>
+          </a:fillRef>
+          <a:effectRef idx="0">
+            <a:schemeClr val="accent1"/>
+          </a:effectRef>
+          <a:fontRef idx="minor">
+            <a:schemeClr val="lt1"/>
+          </a:fontRef>
+        </p:style>
+        <p:txBody>
+          <a:bodyPr rtlCol="0" anchor="ctr" anchorCtr="0"/>
+          <a:lstStyle>
+            <a:defPPr>
+              <a:defRPr lang="en-US"/>
+            </a:defPPr>
+            <a:lvl1pPr>
+              <a:defRPr sz="1400" b="1">
+                <a:solidFill>
+                  <a:srgbClr val="7030A0"/>
+                </a:solidFill>
+              </a:defRPr>
+            </a:lvl1pPr>
+            <a:lvl2pPr>
+              <a:defRPr>
+                <a:solidFill>
+                  <a:schemeClr val="lt1"/>
+                </a:solidFill>
+              </a:defRPr>
+            </a:lvl2pPr>
+            <a:lvl3pPr>
+              <a:defRPr>
+                <a:solidFill>
+                  <a:schemeClr val="lt1"/>
+                </a:solidFill>
+              </a:defRPr>
+            </a:lvl3pPr>
+            <a:lvl4pPr>
+              <a:defRPr>
+                <a:solidFill>
+                  <a:schemeClr val="lt1"/>
+                </a:solidFill>
+              </a:defRPr>
+            </a:lvl4pPr>
+            <a:lvl5pPr>
+              <a:defRPr>
+                <a:solidFill>
+                  <a:schemeClr val="lt1"/>
+                </a:solidFill>
+              </a:defRPr>
+            </a:lvl5pPr>
+            <a:lvl6pPr>
+              <a:defRPr>
+                <a:solidFill>
+                  <a:schemeClr val="lt1"/>
+                </a:solidFill>
+              </a:defRPr>
+            </a:lvl6pPr>
+            <a:lvl7pPr>
+              <a:defRPr>
+                <a:solidFill>
+                  <a:schemeClr val="lt1"/>
+                </a:solidFill>
+              </a:defRPr>
+            </a:lvl7pPr>
+            <a:lvl8pPr>
+              <a:defRPr>
+                <a:solidFill>
+                  <a:schemeClr val="lt1"/>
+                </a:solidFill>
+              </a:defRPr>
+            </a:lvl8pPr>
+            <a:lvl9pPr>
+              <a:defRPr>
+                <a:solidFill>
+                  <a:schemeClr val="lt1"/>
+                </a:solidFill>
+              </a:defRPr>
+            </a:lvl9pPr>
+          </a:lstStyle>
+          <a:p>
+            <a:pPr algn="ctr"/>
+            <a:r>
+              <a:rPr lang="en-US" dirty="0" smtClean="0">
+                <a:solidFill>
+                  <a:schemeClr val="bg1"/>
+                </a:solidFill>
+              </a:rPr>
+              <a:t>Java</a:t>
             </a:r>
             <a:endParaRPr lang="en-SG" dirty="0">
               <a:solidFill>

</xml_diff>